<commit_message>
3DES add aula21 e 22
</commit_message>
<xml_diff>
--- a/3des/projetos/aula07/metodologias.pptx
+++ b/3des/projetos/aula07/metodologias.pptx
@@ -11,7 +11,10 @@
     <p:sldId id="259" r:id="rId5"/>
     <p:sldId id="260" r:id="rId6"/>
     <p:sldId id="261" r:id="rId7"/>
-    <p:sldId id="262" r:id="rId8"/>
+    <p:sldId id="263" r:id="rId8"/>
+    <p:sldId id="264" r:id="rId9"/>
+    <p:sldId id="265" r:id="rId10"/>
+    <p:sldId id="262" r:id="rId11"/>
   </p:sldIdLst>
   <p:sldSz cx="12192000" cy="6858000"/>
   <p:notesSz cx="6858000" cy="9144000"/>
@@ -110,6 +113,11 @@
       </a:defRPr>
     </a:lvl9pPr>
   </p:defaultTextStyle>
+  <p:extLst>
+    <p:ext uri="{EFAFB233-063F-42B5-8137-9DF3F51BA10A}">
+      <p15:sldGuideLst xmlns:p15="http://schemas.microsoft.com/office/powerpoint/2012/main"/>
+    </p:ext>
+  </p:extLst>
 </p:presentation>
 </file>
 
@@ -387,7 +395,7 @@
           <a:p>
             <a:fld id="{3072FA5B-D144-40C1-AA9E-94DF3CF9BFE1}" type="datetimeFigureOut">
               <a:rPr lang="pt-BR" smtClean="0"/>
-              <a:t>20/01/2021</a:t>
+              <a:t>12/05/2021</a:t>
             </a:fld>
             <a:endParaRPr lang="pt-BR"/>
           </a:p>
@@ -801,7 +809,7 @@
           <a:p>
             <a:fld id="{3072FA5B-D144-40C1-AA9E-94DF3CF9BFE1}" type="datetimeFigureOut">
               <a:rPr lang="pt-BR" smtClean="0"/>
-              <a:t>20/01/2021</a:t>
+              <a:t>12/05/2021</a:t>
             </a:fld>
             <a:endParaRPr lang="pt-BR"/>
           </a:p>
@@ -1137,7 +1145,7 @@
           <a:p>
             <a:fld id="{3072FA5B-D144-40C1-AA9E-94DF3CF9BFE1}" type="datetimeFigureOut">
               <a:rPr lang="pt-BR" smtClean="0"/>
-              <a:t>20/01/2021</a:t>
+              <a:t>12/05/2021</a:t>
             </a:fld>
             <a:endParaRPr lang="pt-BR"/>
           </a:p>
@@ -1542,7 +1550,7 @@
           <a:p>
             <a:fld id="{3072FA5B-D144-40C1-AA9E-94DF3CF9BFE1}" type="datetimeFigureOut">
               <a:rPr lang="pt-BR" smtClean="0"/>
-              <a:t>20/01/2021</a:t>
+              <a:t>12/05/2021</a:t>
             </a:fld>
             <a:endParaRPr lang="pt-BR"/>
           </a:p>
@@ -2110,7 +2118,7 @@
           <a:p>
             <a:fld id="{3072FA5B-D144-40C1-AA9E-94DF3CF9BFE1}" type="datetimeFigureOut">
               <a:rPr lang="pt-BR" smtClean="0"/>
-              <a:t>20/01/2021</a:t>
+              <a:t>12/05/2021</a:t>
             </a:fld>
             <a:endParaRPr lang="pt-BR"/>
           </a:p>
@@ -2791,7 +2799,7 @@
           <a:p>
             <a:fld id="{3072FA5B-D144-40C1-AA9E-94DF3CF9BFE1}" type="datetimeFigureOut">
               <a:rPr lang="pt-BR" smtClean="0"/>
-              <a:t>20/01/2021</a:t>
+              <a:t>12/05/2021</a:t>
             </a:fld>
             <a:endParaRPr lang="pt-BR"/>
           </a:p>
@@ -3704,7 +3712,7 @@
           <a:p>
             <a:fld id="{3072FA5B-D144-40C1-AA9E-94DF3CF9BFE1}" type="datetimeFigureOut">
               <a:rPr lang="pt-BR" smtClean="0"/>
-              <a:t>20/01/2021</a:t>
+              <a:t>12/05/2021</a:t>
             </a:fld>
             <a:endParaRPr lang="pt-BR"/>
           </a:p>
@@ -4017,7 +4025,7 @@
           <a:p>
             <a:fld id="{3072FA5B-D144-40C1-AA9E-94DF3CF9BFE1}" type="datetimeFigureOut">
               <a:rPr lang="pt-BR" smtClean="0"/>
-              <a:t>20/01/2021</a:t>
+              <a:t>12/05/2021</a:t>
             </a:fld>
             <a:endParaRPr lang="pt-BR"/>
           </a:p>
@@ -4281,7 +4289,7 @@
           <a:p>
             <a:fld id="{3072FA5B-D144-40C1-AA9E-94DF3CF9BFE1}" type="datetimeFigureOut">
               <a:rPr lang="pt-BR" smtClean="0"/>
-              <a:t>20/01/2021</a:t>
+              <a:t>12/05/2021</a:t>
             </a:fld>
             <a:endParaRPr lang="pt-BR"/>
           </a:p>
@@ -4604,7 +4612,7 @@
           <a:p>
             <a:fld id="{3072FA5B-D144-40C1-AA9E-94DF3CF9BFE1}" type="datetimeFigureOut">
               <a:rPr lang="pt-BR" smtClean="0"/>
-              <a:t>20/01/2021</a:t>
+              <a:t>12/05/2021</a:t>
             </a:fld>
             <a:endParaRPr lang="pt-BR"/>
           </a:p>
@@ -4993,7 +5001,7 @@
           <a:p>
             <a:fld id="{3072FA5B-D144-40C1-AA9E-94DF3CF9BFE1}" type="datetimeFigureOut">
               <a:rPr lang="pt-BR" smtClean="0"/>
-              <a:t>20/01/2021</a:t>
+              <a:t>12/05/2021</a:t>
             </a:fld>
             <a:endParaRPr lang="pt-BR"/>
           </a:p>
@@ -5369,7 +5377,7 @@
           <a:p>
             <a:fld id="{3072FA5B-D144-40C1-AA9E-94DF3CF9BFE1}" type="datetimeFigureOut">
               <a:rPr lang="pt-BR" smtClean="0"/>
-              <a:t>20/01/2021</a:t>
+              <a:t>12/05/2021</a:t>
             </a:fld>
             <a:endParaRPr lang="pt-BR"/>
           </a:p>
@@ -5875,7 +5883,7 @@
           <a:p>
             <a:fld id="{3072FA5B-D144-40C1-AA9E-94DF3CF9BFE1}" type="datetimeFigureOut">
               <a:rPr lang="pt-BR" smtClean="0"/>
-              <a:t>20/01/2021</a:t>
+              <a:t>12/05/2021</a:t>
             </a:fld>
             <a:endParaRPr lang="pt-BR"/>
           </a:p>
@@ -6132,7 +6140,7 @@
           <a:p>
             <a:fld id="{3072FA5B-D144-40C1-AA9E-94DF3CF9BFE1}" type="datetimeFigureOut">
               <a:rPr lang="pt-BR" smtClean="0"/>
-              <a:t>20/01/2021</a:t>
+              <a:t>12/05/2021</a:t>
             </a:fld>
             <a:endParaRPr lang="pt-BR"/>
           </a:p>
@@ -6295,7 +6303,7 @@
           <a:p>
             <a:fld id="{3072FA5B-D144-40C1-AA9E-94DF3CF9BFE1}" type="datetimeFigureOut">
               <a:rPr lang="pt-BR" smtClean="0"/>
-              <a:t>20/01/2021</a:t>
+              <a:t>12/05/2021</a:t>
             </a:fld>
             <a:endParaRPr lang="pt-BR"/>
           </a:p>
@@ -6685,7 +6693,7 @@
           <a:p>
             <a:fld id="{3072FA5B-D144-40C1-AA9E-94DF3CF9BFE1}" type="datetimeFigureOut">
               <a:rPr lang="pt-BR" smtClean="0"/>
-              <a:t>20/01/2021</a:t>
+              <a:t>12/05/2021</a:t>
             </a:fld>
             <a:endParaRPr lang="pt-BR"/>
           </a:p>
@@ -7094,7 +7102,7 @@
           <a:p>
             <a:fld id="{3072FA5B-D144-40C1-AA9E-94DF3CF9BFE1}" type="datetimeFigureOut">
               <a:rPr lang="pt-BR" smtClean="0"/>
-              <a:t>20/01/2021</a:t>
+              <a:t>12/05/2021</a:t>
             </a:fld>
             <a:endParaRPr lang="pt-BR"/>
           </a:p>
@@ -7338,7 +7346,7 @@
           <a:p>
             <a:fld id="{3072FA5B-D144-40C1-AA9E-94DF3CF9BFE1}" type="datetimeFigureOut">
               <a:rPr lang="pt-BR" smtClean="0"/>
-              <a:t>20/01/2021</a:t>
+              <a:t>12/05/2021</a:t>
             </a:fld>
             <a:endParaRPr lang="pt-BR"/>
           </a:p>
@@ -7815,6 +7823,135 @@
 </p:sld>
 </file>
 
+<file path=ppt/slides/slide10.xml><?xml version="1.0" encoding="utf-8"?>
+<p:sld xmlns:a="http://schemas.openxmlformats.org/drawingml/2006/main" xmlns:r="http://schemas.openxmlformats.org/officeDocument/2006/relationships" xmlns:p="http://schemas.openxmlformats.org/presentationml/2006/main">
+  <p:cSld>
+    <p:spTree>
+      <p:nvGrpSpPr>
+        <p:cNvPr id="1" name=""/>
+        <p:cNvGrpSpPr/>
+        <p:nvPr/>
+      </p:nvGrpSpPr>
+      <p:grpSpPr>
+        <a:xfrm>
+          <a:off x="0" y="0"/>
+          <a:ext cx="0" cy="0"/>
+          <a:chOff x="0" y="0"/>
+          <a:chExt cx="0" cy="0"/>
+        </a:xfrm>
+      </p:grpSpPr>
+      <p:sp>
+        <p:nvSpPr>
+          <p:cNvPr id="2" name="Título 1"/>
+          <p:cNvSpPr>
+            <a:spLocks noGrp="1"/>
+          </p:cNvSpPr>
+          <p:nvPr>
+            <p:ph type="title"/>
+          </p:nvPr>
+        </p:nvSpPr>
+        <p:spPr/>
+        <p:txBody>
+          <a:bodyPr/>
+          <a:lstStyle/>
+          <a:p>
+            <a:r>
+              <a:rPr lang="pt-BR" dirty="0" smtClean="0"/>
+              <a:t>Aplicabilidade</a:t>
+            </a:r>
+            <a:endParaRPr lang="pt-BR" dirty="0"/>
+          </a:p>
+        </p:txBody>
+      </p:sp>
+      <p:sp>
+        <p:nvSpPr>
+          <p:cNvPr id="3" name="Espaço Reservado para Conteúdo 2"/>
+          <p:cNvSpPr>
+            <a:spLocks noGrp="1"/>
+          </p:cNvSpPr>
+          <p:nvPr>
+            <p:ph idx="1"/>
+          </p:nvPr>
+        </p:nvSpPr>
+        <p:spPr/>
+        <p:txBody>
+          <a:bodyPr/>
+          <a:lstStyle/>
+          <a:p>
+            <a:r>
+              <a:rPr lang="pt-BR" dirty="0" smtClean="0"/>
+              <a:t>Clássica</a:t>
+            </a:r>
+          </a:p>
+          <a:p>
+            <a:pPr lvl="1"/>
+            <a:r>
+              <a:rPr lang="pt-BR" dirty="0" smtClean="0"/>
+              <a:t>Ainda pode ser aplicável, para o desenvolvimento de produtos mais robustos como SO, Aplicativos específicos (</a:t>
+            </a:r>
+            <a:r>
+              <a:rPr lang="pt-BR" dirty="0" err="1" smtClean="0"/>
+              <a:t>Ex</a:t>
+            </a:r>
+            <a:r>
+              <a:rPr lang="pt-BR" dirty="0" smtClean="0"/>
+              <a:t>: </a:t>
+            </a:r>
+            <a:r>
+              <a:rPr lang="pt-BR" dirty="0" err="1" smtClean="0"/>
+              <a:t>Autocad</a:t>
+            </a:r>
+            <a:r>
+              <a:rPr lang="pt-BR" dirty="0" smtClean="0"/>
+              <a:t>, Photoshop)</a:t>
+            </a:r>
+          </a:p>
+          <a:p>
+            <a:r>
+              <a:rPr lang="pt-BR" dirty="0" smtClean="0"/>
+              <a:t>Ágeis</a:t>
+            </a:r>
+          </a:p>
+          <a:p>
+            <a:pPr lvl="1"/>
+            <a:r>
+              <a:rPr lang="pt-BR" dirty="0" smtClean="0"/>
+              <a:t>Para quase todas demandas atuais devido ao curto espaço de tempo e muita disponibilidade de </a:t>
+            </a:r>
+            <a:r>
+              <a:rPr lang="pt-BR" dirty="0" err="1" smtClean="0"/>
+              <a:t>infra-estrutura</a:t>
+            </a:r>
+            <a:r>
+              <a:rPr lang="pt-BR" dirty="0" smtClean="0"/>
+              <a:t>.</a:t>
+            </a:r>
+          </a:p>
+          <a:p>
+            <a:endParaRPr lang="pt-BR" dirty="0"/>
+          </a:p>
+        </p:txBody>
+      </p:sp>
+    </p:spTree>
+    <p:extLst>
+      <p:ext uri="{BB962C8B-B14F-4D97-AF65-F5344CB8AC3E}">
+        <p14:creationId xmlns:p14="http://schemas.microsoft.com/office/powerpoint/2010/main" val="3152101549"/>
+      </p:ext>
+    </p:extLst>
+  </p:cSld>
+  <p:clrMapOvr>
+    <a:masterClrMapping/>
+  </p:clrMapOvr>
+  <p:timing>
+    <p:tnLst>
+      <p:par>
+        <p:cTn id="1" dur="indefinite" restart="never" nodeType="tmRoot"/>
+      </p:par>
+    </p:tnLst>
+  </p:timing>
+</p:sld>
+</file>
+
 <file path=ppt/slides/slide2.xml><?xml version="1.0" encoding="utf-8"?>
 <p:sld xmlns:a="http://schemas.openxmlformats.org/drawingml/2006/main" xmlns:r="http://schemas.openxmlformats.org/officeDocument/2006/relationships" xmlns:p="http://schemas.openxmlformats.org/presentationml/2006/main">
   <p:cSld>
@@ -8415,98 +8552,257 @@
           <a:p>
             <a:r>
               <a:rPr lang="pt-BR" dirty="0" smtClean="0"/>
-              <a:t>Aplicabilidade</a:t>
+              <a:t>SCRUM</a:t>
             </a:r>
             <a:endParaRPr lang="pt-BR" dirty="0"/>
           </a:p>
         </p:txBody>
       </p:sp>
-      <p:sp>
-        <p:nvSpPr>
-          <p:cNvPr id="3" name="Espaço Reservado para Conteúdo 2"/>
-          <p:cNvSpPr>
-            <a:spLocks noGrp="1"/>
-          </p:cNvSpPr>
+      <p:pic>
+        <p:nvPicPr>
+          <p:cNvPr id="1026" name="Picture 2" descr="Ciclo Metodologia Scrum"/>
+          <p:cNvPicPr>
+            <a:picLocks noGrp="1" noChangeAspect="1" noChangeArrowheads="1"/>
+          </p:cNvPicPr>
           <p:nvPr>
             <p:ph idx="1"/>
           </p:nvPr>
-        </p:nvSpPr>
-        <p:spPr/>
-        <p:txBody>
-          <a:bodyPr/>
-          <a:lstStyle/>
-          <a:p>
-            <a:r>
-              <a:rPr lang="pt-BR" dirty="0" smtClean="0"/>
-              <a:t>Clássica</a:t>
-            </a:r>
-          </a:p>
-          <a:p>
-            <a:pPr lvl="1"/>
-            <a:r>
-              <a:rPr lang="pt-BR" dirty="0" smtClean="0"/>
-              <a:t>Ainda pode ser aplicável, para o desenvolvimento de produtos mais robustos como SO, Aplicativos específicos (</a:t>
-            </a:r>
-            <a:r>
-              <a:rPr lang="pt-BR" dirty="0" err="1" smtClean="0"/>
-              <a:t>Ex</a:t>
-            </a:r>
-            <a:r>
-              <a:rPr lang="pt-BR" dirty="0" smtClean="0"/>
-              <a:t>: </a:t>
-            </a:r>
-            <a:r>
-              <a:rPr lang="pt-BR" dirty="0" err="1" smtClean="0"/>
-              <a:t>Autocad</a:t>
-            </a:r>
-            <a:r>
-              <a:rPr lang="pt-BR" dirty="0" smtClean="0"/>
-              <a:t>, Photoshop)</a:t>
-            </a:r>
-          </a:p>
-          <a:p>
-            <a:r>
-              <a:rPr lang="pt-BR" dirty="0" smtClean="0"/>
-              <a:t>Ágeis</a:t>
-            </a:r>
-          </a:p>
-          <a:p>
-            <a:pPr lvl="1"/>
-            <a:r>
-              <a:rPr lang="pt-BR" dirty="0" smtClean="0"/>
-              <a:t>Para quase todas demandas atuais devido ao curto espaço de tempo e muita disponibilidade de </a:t>
-            </a:r>
-            <a:r>
-              <a:rPr lang="pt-BR" dirty="0" err="1" smtClean="0"/>
-              <a:t>infra-estrutura</a:t>
-            </a:r>
-            <a:r>
-              <a:rPr lang="pt-BR" dirty="0" smtClean="0"/>
-              <a:t>.</a:t>
-            </a:r>
-          </a:p>
-          <a:p>
-            <a:endParaRPr lang="pt-BR" dirty="0"/>
-          </a:p>
-        </p:txBody>
-      </p:sp>
+        </p:nvPicPr>
+        <p:blipFill>
+          <a:blip r:embed="rId2">
+            <a:extLst>
+              <a:ext uri="{28A0092B-C50C-407E-A947-70E740481C1C}">
+                <a14:useLocalDpi xmlns:a14="http://schemas.microsoft.com/office/drawing/2010/main" val="0"/>
+              </a:ext>
+            </a:extLst>
+          </a:blip>
+          <a:srcRect/>
+          <a:stretch>
+            <a:fillRect/>
+          </a:stretch>
+        </p:blipFill>
+        <p:spPr bwMode="auto">
+          <a:xfrm>
+            <a:off x="2441575" y="2016988"/>
+            <a:ext cx="6092826" cy="4238488"/>
+          </a:xfrm>
+          <a:prstGeom prst="rect">
+            <a:avLst/>
+          </a:prstGeom>
+          <a:noFill/>
+          <a:extLst>
+            <a:ext uri="{909E8E84-426E-40DD-AFC4-6F175D3DCCD1}">
+              <a14:hiddenFill xmlns:a14="http://schemas.microsoft.com/office/drawing/2010/main">
+                <a:solidFill>
+                  <a:srgbClr val="FFFFFF"/>
+                </a:solidFill>
+              </a14:hiddenFill>
+            </a:ext>
+          </a:extLst>
+        </p:spPr>
+      </p:pic>
     </p:spTree>
     <p:extLst>
       <p:ext uri="{BB962C8B-B14F-4D97-AF65-F5344CB8AC3E}">
-        <p14:creationId xmlns:p14="http://schemas.microsoft.com/office/powerpoint/2010/main" val="3152101549"/>
+        <p14:creationId xmlns:p14="http://schemas.microsoft.com/office/powerpoint/2010/main" val="2976960082"/>
       </p:ext>
     </p:extLst>
   </p:cSld>
   <p:clrMapOvr>
     <a:masterClrMapping/>
   </p:clrMapOvr>
-  <p:timing>
-    <p:tnLst>
-      <p:par>
-        <p:cTn id="1" dur="indefinite" restart="never" nodeType="tmRoot"/>
-      </p:par>
-    </p:tnLst>
-  </p:timing>
+</p:sld>
+</file>
+
+<file path=ppt/slides/slide8.xml><?xml version="1.0" encoding="utf-8"?>
+<p:sld xmlns:a="http://schemas.openxmlformats.org/drawingml/2006/main" xmlns:r="http://schemas.openxmlformats.org/officeDocument/2006/relationships" xmlns:p="http://schemas.openxmlformats.org/presentationml/2006/main">
+  <p:cSld>
+    <p:spTree>
+      <p:nvGrpSpPr>
+        <p:cNvPr id="1" name=""/>
+        <p:cNvGrpSpPr/>
+        <p:nvPr/>
+      </p:nvGrpSpPr>
+      <p:grpSpPr>
+        <a:xfrm>
+          <a:off x="0" y="0"/>
+          <a:ext cx="0" cy="0"/>
+          <a:chOff x="0" y="0"/>
+          <a:chExt cx="0" cy="0"/>
+        </a:xfrm>
+      </p:grpSpPr>
+      <p:sp>
+        <p:nvSpPr>
+          <p:cNvPr id="2" name="Título 1"/>
+          <p:cNvSpPr>
+            <a:spLocks noGrp="1"/>
+          </p:cNvSpPr>
+          <p:nvPr>
+            <p:ph type="title"/>
+          </p:nvPr>
+        </p:nvSpPr>
+        <p:spPr/>
+        <p:txBody>
+          <a:bodyPr/>
+          <a:lstStyle/>
+          <a:p>
+            <a:r>
+              <a:rPr lang="pt-BR" dirty="0" smtClean="0"/>
+              <a:t>SCRUM</a:t>
+            </a:r>
+            <a:endParaRPr lang="pt-BR" dirty="0"/>
+          </a:p>
+        </p:txBody>
+      </p:sp>
+      <p:pic>
+        <p:nvPicPr>
+          <p:cNvPr id="2052" name="Picture 4" descr="Scrum: A Metodologia Ágil Explicada de Forma Definitiva"/>
+          <p:cNvPicPr>
+            <a:picLocks noGrp="1" noChangeAspect="1" noChangeArrowheads="1"/>
+          </p:cNvPicPr>
+          <p:nvPr>
+            <p:ph idx="1"/>
+          </p:nvPr>
+        </p:nvPicPr>
+        <p:blipFill>
+          <a:blip r:embed="rId2">
+            <a:extLst>
+              <a:ext uri="{28A0092B-C50C-407E-A947-70E740481C1C}">
+                <a14:useLocalDpi xmlns:a14="http://schemas.microsoft.com/office/drawing/2010/main" val="0"/>
+              </a:ext>
+            </a:extLst>
+          </a:blip>
+          <a:srcRect/>
+          <a:stretch>
+            <a:fillRect/>
+          </a:stretch>
+        </p:blipFill>
+        <p:spPr bwMode="auto">
+          <a:xfrm>
+            <a:off x="1675673" y="2176463"/>
+            <a:ext cx="7624630" cy="3919538"/>
+          </a:xfrm>
+          <a:prstGeom prst="rect">
+            <a:avLst/>
+          </a:prstGeom>
+          <a:noFill/>
+          <a:extLst>
+            <a:ext uri="{909E8E84-426E-40DD-AFC4-6F175D3DCCD1}">
+              <a14:hiddenFill xmlns:a14="http://schemas.microsoft.com/office/drawing/2010/main">
+                <a:solidFill>
+                  <a:srgbClr val="FFFFFF"/>
+                </a:solidFill>
+              </a14:hiddenFill>
+            </a:ext>
+          </a:extLst>
+        </p:spPr>
+      </p:pic>
+    </p:spTree>
+    <p:extLst>
+      <p:ext uri="{BB962C8B-B14F-4D97-AF65-F5344CB8AC3E}">
+        <p14:creationId xmlns:p14="http://schemas.microsoft.com/office/powerpoint/2010/main" val="308010774"/>
+      </p:ext>
+    </p:extLst>
+  </p:cSld>
+  <p:clrMapOvr>
+    <a:masterClrMapping/>
+  </p:clrMapOvr>
+</p:sld>
+</file>
+
+<file path=ppt/slides/slide9.xml><?xml version="1.0" encoding="utf-8"?>
+<p:sld xmlns:a="http://schemas.openxmlformats.org/drawingml/2006/main" xmlns:r="http://schemas.openxmlformats.org/officeDocument/2006/relationships" xmlns:p="http://schemas.openxmlformats.org/presentationml/2006/main">
+  <p:cSld>
+    <p:spTree>
+      <p:nvGrpSpPr>
+        <p:cNvPr id="1" name=""/>
+        <p:cNvGrpSpPr/>
+        <p:nvPr/>
+      </p:nvGrpSpPr>
+      <p:grpSpPr>
+        <a:xfrm>
+          <a:off x="0" y="0"/>
+          <a:ext cx="0" cy="0"/>
+          <a:chOff x="0" y="0"/>
+          <a:chExt cx="0" cy="0"/>
+        </a:xfrm>
+      </p:grpSpPr>
+      <p:sp>
+        <p:nvSpPr>
+          <p:cNvPr id="2" name="Título 1"/>
+          <p:cNvSpPr>
+            <a:spLocks noGrp="1"/>
+          </p:cNvSpPr>
+          <p:nvPr>
+            <p:ph type="title"/>
+          </p:nvPr>
+        </p:nvSpPr>
+        <p:spPr/>
+        <p:txBody>
+          <a:bodyPr/>
+          <a:lstStyle/>
+          <a:p>
+            <a:r>
+              <a:rPr lang="pt-BR" dirty="0" smtClean="0"/>
+              <a:t>SCRUM</a:t>
+            </a:r>
+            <a:endParaRPr lang="pt-BR" dirty="0"/>
+          </a:p>
+        </p:txBody>
+      </p:sp>
+      <p:pic>
+        <p:nvPicPr>
+          <p:cNvPr id="3074" name="Picture 2" descr="Scrum: A Metodologia Ágil Simplificada"/>
+          <p:cNvPicPr>
+            <a:picLocks noGrp="1" noChangeAspect="1" noChangeArrowheads="1"/>
+          </p:cNvPicPr>
+          <p:nvPr>
+            <p:ph idx="1"/>
+          </p:nvPr>
+        </p:nvPicPr>
+        <p:blipFill>
+          <a:blip r:embed="rId2">
+            <a:extLst>
+              <a:ext uri="{28A0092B-C50C-407E-A947-70E740481C1C}">
+                <a14:useLocalDpi xmlns:a14="http://schemas.microsoft.com/office/drawing/2010/main" val="0"/>
+              </a:ext>
+            </a:extLst>
+          </a:blip>
+          <a:srcRect/>
+          <a:stretch>
+            <a:fillRect/>
+          </a:stretch>
+        </p:blipFill>
+        <p:spPr bwMode="auto">
+          <a:xfrm>
+            <a:off x="1773238" y="2612231"/>
+            <a:ext cx="7429500" cy="3048000"/>
+          </a:xfrm>
+          <a:prstGeom prst="rect">
+            <a:avLst/>
+          </a:prstGeom>
+          <a:noFill/>
+          <a:extLst>
+            <a:ext uri="{909E8E84-426E-40DD-AFC4-6F175D3DCCD1}">
+              <a14:hiddenFill xmlns:a14="http://schemas.microsoft.com/office/drawing/2010/main">
+                <a:solidFill>
+                  <a:srgbClr val="FFFFFF"/>
+                </a:solidFill>
+              </a14:hiddenFill>
+            </a:ext>
+          </a:extLst>
+        </p:spPr>
+      </p:pic>
+    </p:spTree>
+    <p:extLst>
+      <p:ext uri="{BB962C8B-B14F-4D97-AF65-F5344CB8AC3E}">
+        <p14:creationId xmlns:p14="http://schemas.microsoft.com/office/powerpoint/2010/main" val="1886994082"/>
+      </p:ext>
+    </p:extLst>
+  </p:cSld>
+  <p:clrMapOvr>
+    <a:masterClrMapping/>
+  </p:clrMapOvr>
 </p:sld>
 </file>
 

</xml_diff>